<commit_message>
AAAA AAAA  AA HHHHHHH
</commit_message>
<xml_diff>
--- a/Mini Projet SE.pptx
+++ b/Mini Projet SE.pptx
@@ -256,7 +256,7 @@
           <a:p>
             <a:fld id="{9BE0948D-3ABA-4C14-8A3F-A44A4BD785D2}" type="datetimeFigureOut">
               <a:rPr lang="zh-CN" altLang="en-US" smtClean="0"/>
-              <a:t>2024/5/13</a:t>
+              <a:t>2024/5/20</a:t>
             </a:fld>
             <a:endParaRPr lang="zh-CN" altLang="en-US"/>
           </a:p>
@@ -433,7 +433,7 @@
           <a:p>
             <a:fld id="{C8AF9FAD-7CAC-4022-B2D4-7FD28C9AB7F7}" type="datetimeFigureOut">
               <a:rPr lang="zh-CN" altLang="en-US" smtClean="0"/>
-              <a:t>2024/5/13</a:t>
+              <a:t>2024/5/20</a:t>
             </a:fld>
             <a:endParaRPr lang="zh-CN" altLang="en-US"/>
           </a:p>
@@ -1035,7 +1035,7 @@
           <a:p>
             <a:fld id="{74742F3E-182A-4E42-99A7-A84D607325D2}" type="datetimeFigureOut">
               <a:rPr lang="zh-CN" altLang="en-US" smtClean="0"/>
-              <a:t>2024/5/13</a:t>
+              <a:t>2024/5/20</a:t>
             </a:fld>
             <a:endParaRPr lang="zh-CN" altLang="en-US"/>
           </a:p>
@@ -1227,7 +1227,7 @@
           <a:p>
             <a:fld id="{74742F3E-182A-4E42-99A7-A84D607325D2}" type="datetimeFigureOut">
               <a:rPr lang="zh-CN" altLang="en-US" smtClean="0"/>
-              <a:t>2024/5/13</a:t>
+              <a:t>2024/5/20</a:t>
             </a:fld>
             <a:endParaRPr lang="zh-CN" altLang="en-US"/>
           </a:p>
@@ -2020,7 +2020,7 @@
           <a:p>
             <a:fld id="{74742F3E-182A-4E42-99A7-A84D607325D2}" type="datetimeFigureOut">
               <a:rPr lang="zh-CN" altLang="en-US" smtClean="0"/>
-              <a:t>2024/5/13</a:t>
+              <a:t>2024/5/20</a:t>
             </a:fld>
             <a:endParaRPr lang="zh-CN" altLang="en-US"/>
           </a:p>
@@ -3524,7 +3524,7 @@
                 <a:t>OUAMMOU </a:t>
               </a:r>
               <a:r>
-                <a:rPr lang="fr-FR" sz="1600" dirty="0" err="1">
+                <a:rPr lang="fr-FR" sz="1600" smtClean="0">
                   <a:solidFill>
                     <a:schemeClr val="bg1"/>
                   </a:solidFill>
@@ -3532,7 +3532,7 @@
                   <a:ea typeface="Roboto Slab ExtraLight" pitchFamily="2" charset="0"/>
                   <a:cs typeface="Segoe UI" panose="020B0502040204020203" pitchFamily="34" charset="0"/>
                 </a:rPr>
-                <a:t>mouraf</a:t>
+                <a:t>mourad</a:t>
               </a:r>
               <a:endParaRPr lang="fr-FR" sz="1600" dirty="0">
                 <a:solidFill>
@@ -4546,13 +4546,13 @@
   <p:clrMapOvr>
     <a:masterClrMapping/>
   </p:clrMapOvr>
-  <mc:AlternateContent xmlns:mc="http://schemas.openxmlformats.org/markup-compatibility/2006">
-    <mc:Choice xmlns:p159="http://schemas.microsoft.com/office/powerpoint/2015/09/main" Requires="p159">
+  <mc:AlternateContent xmlns:mc="http://schemas.openxmlformats.org/markup-compatibility/2006" xmlns:p159="http://schemas.microsoft.com/office/powerpoint/2015/09/main">
+    <mc:Choice Requires="p159">
       <p:transition xmlns:p14="http://schemas.microsoft.com/office/powerpoint/2010/main" spd="slow" p14:dur="2000">
         <p159:morph option="byObject"/>
       </p:transition>
     </mc:Choice>
-    <mc:Fallback>
+    <mc:Fallback xmlns="">
       <p:transition spd="slow">
         <p:fade/>
       </p:transition>
@@ -4704,7 +4704,7 @@
                     <a14:useLocalDpi xmlns:a14="http://schemas.microsoft.com/office/drawing/2010/main" val="0"/>
                   </a:ext>
                   <a:ext uri="{96DAC541-7B7A-43D3-8B79-37D633B846F1}">
-                    <asvg:svgBlip xmlns:asvg="http://schemas.microsoft.com/office/drawing/2016/SVG/main" r:embed="rId3"/>
+                    <asvg:svgBlip xmlns:asvg="http://schemas.microsoft.com/office/drawing/2016/SVG/main" xmlns="" r:embed="rId3"/>
                   </a:ext>
                 </a:extLst>
               </a:blip>
@@ -4865,13 +4865,13 @@
   <p:clrMapOvr>
     <a:masterClrMapping/>
   </p:clrMapOvr>
-  <mc:AlternateContent xmlns:mc="http://schemas.openxmlformats.org/markup-compatibility/2006">
-    <mc:Choice xmlns:p159="http://schemas.microsoft.com/office/powerpoint/2015/09/main" Requires="p159">
+  <mc:AlternateContent xmlns:mc="http://schemas.openxmlformats.org/markup-compatibility/2006" xmlns:p159="http://schemas.microsoft.com/office/powerpoint/2015/09/main">
+    <mc:Choice Requires="p159">
       <p:transition xmlns:p14="http://schemas.microsoft.com/office/powerpoint/2010/main" spd="slow" p14:dur="2000">
         <p159:morph option="byObject"/>
       </p:transition>
     </mc:Choice>
-    <mc:Fallback>
+    <mc:Fallback xmlns="">
       <p:transition spd="slow">
         <p:fade/>
       </p:transition>
@@ -5176,7 +5176,7 @@
           <p:nvPr/>
         </p:nvPicPr>
         <p:blipFill>
-          <a:blip r:embed="rId2">
+          <a:blip r:embed="rId2" cstate="hqprint">
             <a:extLst>
               <a:ext uri="{28A0092B-C50C-407E-A947-70E740481C1C}">
                 <a14:useLocalDpi xmlns:a14="http://schemas.microsoft.com/office/drawing/2010/main" val="0"/>
@@ -5256,13 +5256,13 @@
   <p:clrMapOvr>
     <a:masterClrMapping/>
   </p:clrMapOvr>
-  <mc:AlternateContent xmlns:mc="http://schemas.openxmlformats.org/markup-compatibility/2006">
-    <mc:Choice xmlns:p159="http://schemas.microsoft.com/office/powerpoint/2015/09/main" Requires="p159">
+  <mc:AlternateContent xmlns:mc="http://schemas.openxmlformats.org/markup-compatibility/2006" xmlns:p159="http://schemas.microsoft.com/office/powerpoint/2015/09/main">
+    <mc:Choice Requires="p159">
       <p:transition xmlns:p14="http://schemas.microsoft.com/office/powerpoint/2010/main" spd="slow" p14:dur="2000">
         <p159:morph option="byObject"/>
       </p:transition>
     </mc:Choice>
-    <mc:Fallback>
+    <mc:Fallback xmlns="">
       <p:transition spd="slow">
         <p:fade/>
       </p:transition>
@@ -5515,7 +5515,7 @@
           <p:nvPr/>
         </p:nvPicPr>
         <p:blipFill>
-          <a:blip r:embed="rId2">
+          <a:blip r:embed="rId2" cstate="hqprint">
             <a:extLst>
               <a:ext uri="{28A0092B-C50C-407E-A947-70E740481C1C}">
                 <a14:useLocalDpi xmlns:a14="http://schemas.microsoft.com/office/drawing/2010/main" val="0"/>
@@ -5551,7 +5551,7 @@
           <p:nvPr/>
         </p:nvPicPr>
         <p:blipFill>
-          <a:blip r:embed="rId3">
+          <a:blip r:embed="rId3" cstate="hqprint">
             <a:extLst>
               <a:ext uri="{28A0092B-C50C-407E-A947-70E740481C1C}">
                 <a14:useLocalDpi xmlns:a14="http://schemas.microsoft.com/office/drawing/2010/main" val="0"/>
@@ -5587,7 +5587,7 @@
           <p:nvPr/>
         </p:nvPicPr>
         <p:blipFill>
-          <a:blip r:embed="rId4">
+          <a:blip r:embed="rId4" cstate="hqprint">
             <a:extLst>
               <a:ext uri="{28A0092B-C50C-407E-A947-70E740481C1C}">
                 <a14:useLocalDpi xmlns:a14="http://schemas.microsoft.com/office/drawing/2010/main" val="0"/>

</xml_diff>